<commit_message>
update plan, partially accurate
</commit_message>
<xml_diff>
--- a/doc/plan.pptx
+++ b/doc/plan.pptx
@@ -4430,7 +4430,7 @@
         <p:spPr>
           <a:xfrm>
             <a:off x="3348820" y="2479105"/>
-            <a:ext cx="1976823" cy="646331"/>
+            <a:ext cx="1425390" cy="646331"/>
           </a:xfrm>
           <a:prstGeom prst="rect">
             <a:avLst/>
@@ -4447,16 +4447,20 @@
                 <a:latin typeface="Courier New" panose="02070309020205020404" pitchFamily="49" charset="0"/>
                 <a:cs typeface="Courier New" panose="02070309020205020404" pitchFamily="49" charset="0"/>
               </a:rPr>
-              <a:t>plot_offset_x</a:t>
-            </a:r>
-          </a:p>
-          <a:p>
-            <a:r>
+              <a:t>plot_left</a:t>
+            </a:r>
+            <a:br>
               <a:rPr lang="en-US" b="1">
                 <a:latin typeface="Courier New" panose="02070309020205020404" pitchFamily="49" charset="0"/>
                 <a:cs typeface="Courier New" panose="02070309020205020404" pitchFamily="49" charset="0"/>
               </a:rPr>
-              <a:t>plot_offset_y</a:t>
+            </a:br>
+            <a:r>
+              <a:rPr lang="en-US" b="1">
+                <a:latin typeface="Courier New" panose="02070309020205020404" pitchFamily="49" charset="0"/>
+                <a:cs typeface="Courier New" panose="02070309020205020404" pitchFamily="49" charset="0"/>
+              </a:rPr>
+              <a:t>plot_top</a:t>
             </a:r>
           </a:p>
         </p:txBody>
@@ -5352,7 +5356,7 @@
         </p:nvSpPr>
         <p:spPr>
           <a:xfrm>
-            <a:off x="429920" y="5881882"/>
+            <a:off x="2593884" y="2583204"/>
             <a:ext cx="1425390" cy="646331"/>
           </a:xfrm>
           <a:prstGeom prst="rect">
@@ -5372,14 +5376,18 @@
               </a:rPr>
               <a:t>axis_left</a:t>
             </a:r>
-          </a:p>
-          <a:p>
-            <a:r>
+            <a:br>
               <a:rPr lang="en-US" b="1">
                 <a:latin typeface="Courier New" panose="02070309020205020404" pitchFamily="49" charset="0"/>
                 <a:cs typeface="Courier New" panose="02070309020205020404" pitchFamily="49" charset="0"/>
               </a:rPr>
-              <a:t>axis_bot</a:t>
+            </a:br>
+            <a:r>
+              <a:rPr lang="en-US" b="1">
+                <a:latin typeface="Courier New" panose="02070309020205020404" pitchFamily="49" charset="0"/>
+                <a:cs typeface="Courier New" panose="02070309020205020404" pitchFamily="49" charset="0"/>
+              </a:rPr>
+              <a:t>axis_top</a:t>
             </a:r>
           </a:p>
         </p:txBody>
@@ -5399,9 +5407,9 @@
           <p:nvPr/>
         </p:nvCxnSpPr>
         <p:spPr>
-          <a:xfrm flipH="1">
-            <a:off x="1851251" y="5776710"/>
-            <a:ext cx="513751" cy="369332"/>
+          <a:xfrm>
+            <a:off x="2593884" y="2311966"/>
+            <a:ext cx="262186" cy="291880"/>
           </a:xfrm>
           <a:prstGeom prst="straightConnector1">
             <a:avLst/>
@@ -5443,7 +5451,7 @@
         </p:nvSpPr>
         <p:spPr>
           <a:xfrm>
-            <a:off x="2375162" y="5584211"/>
+            <a:off x="2390684" y="2108766"/>
             <a:ext cx="203200" cy="203200"/>
           </a:xfrm>
           <a:prstGeom prst="ellipse">
@@ -5702,7 +5710,7 @@
         </p:nvSpPr>
         <p:spPr>
           <a:xfrm>
-            <a:off x="3166434" y="2558304"/>
+            <a:off x="5217217" y="2377690"/>
             <a:ext cx="1425390" cy="646331"/>
           </a:xfrm>
           <a:prstGeom prst="rect">
@@ -5749,9 +5757,9 @@
           <p:nvPr/>
         </p:nvCxnSpPr>
         <p:spPr>
-          <a:xfrm flipH="1" flipV="1">
-            <a:off x="4487024" y="3020848"/>
-            <a:ext cx="349659" cy="253961"/>
+          <a:xfrm flipV="1">
+            <a:off x="5067669" y="2972653"/>
+            <a:ext cx="242383" cy="244652"/>
           </a:xfrm>
           <a:prstGeom prst="straightConnector1">
             <a:avLst/>
@@ -5779,153 +5787,6 @@
           </a:fontRef>
         </p:style>
       </p:cxnSp>
-      <p:sp>
-        <p:nvSpPr>
-          <p:cNvPr id="73" name="Oval 72">
-            <a:extLst>
-              <a:ext uri="{FF2B5EF4-FFF2-40B4-BE49-F238E27FC236}">
-                <a16:creationId xmlns:a16="http://schemas.microsoft.com/office/drawing/2014/main" id="{3EF0C6B2-A9BB-45B3-B9C3-46A5446B23EC}"/>
-              </a:ext>
-            </a:extLst>
-          </p:cNvPr>
-          <p:cNvSpPr/>
-          <p:nvPr/>
-        </p:nvSpPr>
-        <p:spPr>
-          <a:xfrm>
-            <a:off x="6490428" y="4307487"/>
-            <a:ext cx="203200" cy="203200"/>
-          </a:xfrm>
-          <a:prstGeom prst="ellipse">
-            <a:avLst/>
-          </a:prstGeom>
-          <a:solidFill>
-            <a:schemeClr val="accent4">
-              <a:lumMod val="75000"/>
-            </a:schemeClr>
-          </a:solidFill>
-          <a:ln w="25400">
-            <a:solidFill>
-              <a:schemeClr val="tx1"/>
-            </a:solidFill>
-          </a:ln>
-        </p:spPr>
-        <p:style>
-          <a:lnRef idx="2">
-            <a:schemeClr val="accent1">
-              <a:shade val="50000"/>
-            </a:schemeClr>
-          </a:lnRef>
-          <a:fillRef idx="1">
-            <a:schemeClr val="accent1"/>
-          </a:fillRef>
-          <a:effectRef idx="0">
-            <a:schemeClr val="accent1"/>
-          </a:effectRef>
-          <a:fontRef idx="minor">
-            <a:schemeClr val="lt1"/>
-          </a:fontRef>
-        </p:style>
-        <p:txBody>
-          <a:bodyPr rtlCol="0" anchor="ctr"/>
-          <a:lstStyle/>
-          <a:p>
-            <a:pPr algn="ctr"/>
-            <a:endParaRPr lang="en-US"/>
-          </a:p>
-        </p:txBody>
-      </p:sp>
-      <p:cxnSp>
-        <p:nvCxnSpPr>
-          <p:cNvPr id="74" name="Straight Arrow Connector 73">
-            <a:extLst>
-              <a:ext uri="{FF2B5EF4-FFF2-40B4-BE49-F238E27FC236}">
-                <a16:creationId xmlns:a16="http://schemas.microsoft.com/office/drawing/2014/main" id="{F7C8F353-40D7-42E7-A55E-2ABA259570FE}"/>
-              </a:ext>
-            </a:extLst>
-          </p:cNvPr>
-          <p:cNvCxnSpPr>
-            <a:cxnSpLocks/>
-          </p:cNvCxnSpPr>
-          <p:nvPr/>
-        </p:nvCxnSpPr>
-        <p:spPr>
-          <a:xfrm>
-            <a:off x="6658372" y="4494201"/>
-            <a:ext cx="440514" cy="575300"/>
-          </a:xfrm>
-          <a:prstGeom prst="straightConnector1">
-            <a:avLst/>
-          </a:prstGeom>
-          <a:ln w="38100">
-            <a:solidFill>
-              <a:schemeClr val="tx1"/>
-            </a:solidFill>
-            <a:headEnd type="triangle" w="lg" len="lg"/>
-            <a:tailEnd type="none" w="lg" len="lg"/>
-          </a:ln>
-        </p:spPr>
-        <p:style>
-          <a:lnRef idx="1">
-            <a:schemeClr val="accent1"/>
-          </a:lnRef>
-          <a:fillRef idx="0">
-            <a:schemeClr val="accent1"/>
-          </a:fillRef>
-          <a:effectRef idx="0">
-            <a:schemeClr val="accent1"/>
-          </a:effectRef>
-          <a:fontRef idx="minor">
-            <a:schemeClr val="tx1"/>
-          </a:fontRef>
-        </p:style>
-      </p:cxnSp>
-      <p:sp>
-        <p:nvSpPr>
-          <p:cNvPr id="76" name="Rectangle 75">
-            <a:extLst>
-              <a:ext uri="{FF2B5EF4-FFF2-40B4-BE49-F238E27FC236}">
-                <a16:creationId xmlns:a16="http://schemas.microsoft.com/office/drawing/2014/main" id="{FEE0D36B-9DE8-452A-BD9E-D41AD75C08C0}"/>
-              </a:ext>
-            </a:extLst>
-          </p:cNvPr>
-          <p:cNvSpPr/>
-          <p:nvPr/>
-        </p:nvSpPr>
-        <p:spPr>
-          <a:xfrm>
-            <a:off x="7098886" y="4777328"/>
-            <a:ext cx="1563248" cy="646331"/>
-          </a:xfrm>
-          <a:prstGeom prst="rect">
-            <a:avLst/>
-          </a:prstGeom>
-        </p:spPr>
-        <p:txBody>
-          <a:bodyPr wrap="none">
-            <a:spAutoFit/>
-          </a:bodyPr>
-          <a:lstStyle/>
-          <a:p>
-            <a:r>
-              <a:rPr lang="en-US" b="1">
-                <a:latin typeface="Courier New" panose="02070309020205020404" pitchFamily="49" charset="0"/>
-                <a:cs typeface="Courier New" panose="02070309020205020404" pitchFamily="49" charset="0"/>
-              </a:rPr>
-              <a:t>view_right</a:t>
-            </a:r>
-          </a:p>
-          <a:p>
-            <a:r>
-              <a:rPr lang="en-US" b="1">
-                <a:latin typeface="Courier New" panose="02070309020205020404" pitchFamily="49" charset="0"/>
-                <a:cs typeface="Courier New" panose="02070309020205020404" pitchFamily="49" charset="0"/>
-              </a:rPr>
-              <a:t>view_bot</a:t>
-            </a:r>
-          </a:p>
-        </p:txBody>
-      </p:sp>
       <p:sp>
         <p:nvSpPr>
           <p:cNvPr id="78" name="Rectangle 77">

</xml_diff>